<commit_message>
change on Naive bayes
</commit_message>
<xml_diff>
--- a/ML Algorithm/Classification/Naive Bayes.pptx
+++ b/ML Algorithm/Classification/Naive Bayes.pptx
@@ -271,7 +271,7 @@
           <a:p>
             <a:fld id="{2D8EB905-EBB6-48B4-B888-C05DEA69D18C}" type="datetimeFigureOut">
               <a:rPr lang="en-US" smtClean="0"/>
-              <a:t>11/20/2021</a:t>
+              <a:t>7/24/2022</a:t>
             </a:fld>
             <a:endParaRPr lang="en-US"/>
           </a:p>
@@ -469,7 +469,7 @@
           <a:p>
             <a:fld id="{2D8EB905-EBB6-48B4-B888-C05DEA69D18C}" type="datetimeFigureOut">
               <a:rPr lang="en-US" smtClean="0"/>
-              <a:t>11/20/2021</a:t>
+              <a:t>7/24/2022</a:t>
             </a:fld>
             <a:endParaRPr lang="en-US"/>
           </a:p>
@@ -677,7 +677,7 @@
           <a:p>
             <a:fld id="{2D8EB905-EBB6-48B4-B888-C05DEA69D18C}" type="datetimeFigureOut">
               <a:rPr lang="en-US" smtClean="0"/>
-              <a:t>11/20/2021</a:t>
+              <a:t>7/24/2022</a:t>
             </a:fld>
             <a:endParaRPr lang="en-US"/>
           </a:p>
@@ -875,7 +875,7 @@
           <a:p>
             <a:fld id="{2D8EB905-EBB6-48B4-B888-C05DEA69D18C}" type="datetimeFigureOut">
               <a:rPr lang="en-US" smtClean="0"/>
-              <a:t>11/20/2021</a:t>
+              <a:t>7/24/2022</a:t>
             </a:fld>
             <a:endParaRPr lang="en-US"/>
           </a:p>
@@ -1150,7 +1150,7 @@
           <a:p>
             <a:fld id="{2D8EB905-EBB6-48B4-B888-C05DEA69D18C}" type="datetimeFigureOut">
               <a:rPr lang="en-US" smtClean="0"/>
-              <a:t>11/20/2021</a:t>
+              <a:t>7/24/2022</a:t>
             </a:fld>
             <a:endParaRPr lang="en-US"/>
           </a:p>
@@ -1415,7 +1415,7 @@
           <a:p>
             <a:fld id="{2D8EB905-EBB6-48B4-B888-C05DEA69D18C}" type="datetimeFigureOut">
               <a:rPr lang="en-US" smtClean="0"/>
-              <a:t>11/20/2021</a:t>
+              <a:t>7/24/2022</a:t>
             </a:fld>
             <a:endParaRPr lang="en-US"/>
           </a:p>
@@ -1827,7 +1827,7 @@
           <a:p>
             <a:fld id="{2D8EB905-EBB6-48B4-B888-C05DEA69D18C}" type="datetimeFigureOut">
               <a:rPr lang="en-US" smtClean="0"/>
-              <a:t>11/20/2021</a:t>
+              <a:t>7/24/2022</a:t>
             </a:fld>
             <a:endParaRPr lang="en-US"/>
           </a:p>
@@ -1968,7 +1968,7 @@
           <a:p>
             <a:fld id="{2D8EB905-EBB6-48B4-B888-C05DEA69D18C}" type="datetimeFigureOut">
               <a:rPr lang="en-US" smtClean="0"/>
-              <a:t>11/20/2021</a:t>
+              <a:t>7/24/2022</a:t>
             </a:fld>
             <a:endParaRPr lang="en-US"/>
           </a:p>
@@ -2081,7 +2081,7 @@
           <a:p>
             <a:fld id="{2D8EB905-EBB6-48B4-B888-C05DEA69D18C}" type="datetimeFigureOut">
               <a:rPr lang="en-US" smtClean="0"/>
-              <a:t>11/20/2021</a:t>
+              <a:t>7/24/2022</a:t>
             </a:fld>
             <a:endParaRPr lang="en-US"/>
           </a:p>
@@ -2392,7 +2392,7 @@
           <a:p>
             <a:fld id="{2D8EB905-EBB6-48B4-B888-C05DEA69D18C}" type="datetimeFigureOut">
               <a:rPr lang="en-US" smtClean="0"/>
-              <a:t>11/20/2021</a:t>
+              <a:t>7/24/2022</a:t>
             </a:fld>
             <a:endParaRPr lang="en-US"/>
           </a:p>
@@ -2680,7 +2680,7 @@
           <a:p>
             <a:fld id="{2D8EB905-EBB6-48B4-B888-C05DEA69D18C}" type="datetimeFigureOut">
               <a:rPr lang="en-US" smtClean="0"/>
-              <a:t>11/20/2021</a:t>
+              <a:t>7/24/2022</a:t>
             </a:fld>
             <a:endParaRPr lang="en-US"/>
           </a:p>
@@ -2921,7 +2921,7 @@
           <a:p>
             <a:fld id="{2D8EB905-EBB6-48B4-B888-C05DEA69D18C}" type="datetimeFigureOut">
               <a:rPr lang="en-US" smtClean="0"/>
-              <a:t>11/20/2021</a:t>
+              <a:t>7/24/2022</a:t>
             </a:fld>
             <a:endParaRPr lang="en-US"/>
           </a:p>
@@ -3392,7 +3392,7 @@
         <p:spPr>
           <a:xfrm>
             <a:off x="1524000" y="1476354"/>
-            <a:ext cx="9144000" cy="5025387"/>
+            <a:ext cx="9144000" cy="4160517"/>
           </a:xfrm>
         </p:spPr>
         <p:txBody>
@@ -3409,7 +3409,7 @@
                 </a:solidFill>
                 <a:effectLst/>
               </a:rPr>
-              <a:t>What is naïve bayes?</a:t>
+              <a:t>What is naïve Bayes?</a:t>
             </a:r>
           </a:p>
           <a:p>
@@ -3440,7 +3440,25 @@
                 </a:solidFill>
                 <a:effectLst/>
               </a:rPr>
-              <a:t> task in machine learning. Even if we are working on a data set with millions of records with some attributes, it is suggested to try Naive Bayes approach.</a:t>
+              <a:t> task in machine learning. Even if we are working on a data set with </a:t>
+            </a:r>
+            <a:r>
+              <a:rPr lang="en-US" sz="2000" b="1" i="0" dirty="0">
+                <a:solidFill>
+                  <a:srgbClr val="292929"/>
+                </a:solidFill>
+                <a:effectLst/>
+              </a:rPr>
+              <a:t>millions</a:t>
+            </a:r>
+            <a:r>
+              <a:rPr lang="en-US" sz="2000" b="0" i="0" dirty="0">
+                <a:solidFill>
+                  <a:srgbClr val="292929"/>
+                </a:solidFill>
+                <a:effectLst/>
+              </a:rPr>
+              <a:t> of records with some attributes, it is suggested to try Naive Bayes approach.</a:t>
             </a:r>
           </a:p>
           <a:p>
@@ -3470,7 +3488,25 @@
                 </a:solidFill>
                 <a:effectLst/>
               </a:rPr>
-              <a:t> Such as Natural Language Processing.</a:t>
+              <a:t> Such as </a:t>
+            </a:r>
+            <a:r>
+              <a:rPr lang="en-US" sz="2000" b="1" i="0" dirty="0">
+                <a:solidFill>
+                  <a:srgbClr val="292929"/>
+                </a:solidFill>
+                <a:effectLst/>
+              </a:rPr>
+              <a:t>Natural Language Processing</a:t>
+            </a:r>
+            <a:r>
+              <a:rPr lang="en-US" sz="2000" b="0" i="0" dirty="0">
+                <a:solidFill>
+                  <a:srgbClr val="292929"/>
+                </a:solidFill>
+                <a:effectLst/>
+              </a:rPr>
+              <a:t>.</a:t>
             </a:r>
           </a:p>
           <a:p>
@@ -3489,7 +3525,7 @@
             <a:pPr algn="l"/>
             <a:r>
               <a:rPr lang="en-US" dirty="0"/>
-              <a:t>At first you have to know:</a:t>
+              <a:t>At first, you have to know:</a:t>
             </a:r>
           </a:p>
           <a:p>
@@ -3988,7 +4024,7 @@
             <a:r>
               <a:rPr lang="en-US" sz="2600" b="1" i="0" dirty="0">
                 <a:solidFill>
-                  <a:srgbClr val="292929"/>
+                  <a:srgbClr val="FF0000"/>
                 </a:solidFill>
                 <a:effectLst/>
               </a:rPr>
@@ -4116,7 +4152,7 @@
         </p:nvSpPr>
         <p:spPr>
           <a:xfrm>
-            <a:off x="407718" y="1050408"/>
+            <a:off x="407718" y="1684866"/>
             <a:ext cx="4674921" cy="445883"/>
           </a:xfrm>
         </p:spPr>
@@ -4134,7 +4170,16 @@
                 </a:solidFill>
                 <a:effectLst/>
               </a:rPr>
-              <a:t>What is conditional probability?</a:t>
+              <a:t>What is </a:t>
+            </a:r>
+            <a:r>
+              <a:rPr lang="en-US" sz="2600" b="1" i="0" dirty="0">
+                <a:solidFill>
+                  <a:srgbClr val="FF0000"/>
+                </a:solidFill>
+                <a:effectLst/>
+              </a:rPr>
+              <a:t>conditional probability?</a:t>
             </a:r>
           </a:p>
         </p:txBody>
@@ -4155,7 +4200,7 @@
         </p:nvSpPr>
         <p:spPr>
           <a:xfrm>
-            <a:off x="407718" y="1769670"/>
+            <a:off x="407718" y="2649346"/>
             <a:ext cx="11135098" cy="2921083"/>
           </a:xfrm>
           <a:prstGeom prst="rect">
@@ -4339,7 +4384,16 @@
                 </a:solidFill>
                 <a:effectLst/>
               </a:rPr>
-              <a:t>In probability theory, conditional probability is a measure of the probability of an event occurring, given that another event has already occurred.</a:t>
+              <a:t>In probability theory, conditional probability is a measure of the probability of an event occurring, </a:t>
+            </a:r>
+            <a:r>
+              <a:rPr lang="en-US" sz="2000" b="1" i="0" dirty="0">
+                <a:solidFill>
+                  <a:srgbClr val="00B0F0"/>
+                </a:solidFill>
+                <a:effectLst/>
+              </a:rPr>
+              <a:t>given that another event has already occurred.</a:t>
             </a:r>
           </a:p>
           <a:p>
@@ -4392,12 +4446,20 @@
           <a:p>
             <a:pPr algn="just"/>
             <a:r>
+              <a:rPr lang="en-US" sz="2000" b="1" dirty="0">
+                <a:solidFill>
+                  <a:srgbClr val="FF0000"/>
+                </a:solidFill>
+              </a:rPr>
+              <a:t>Example:</a:t>
+            </a:r>
+            <a:r>
               <a:rPr lang="en-US" sz="2000" dirty="0">
                 <a:solidFill>
                   <a:srgbClr val="4D5156"/>
                 </a:solidFill>
               </a:rPr>
-              <a:t>Example: If you roll a dice what is probability  to get 5 if </a:t>
+              <a:t> If you roll a dice what is the probability to get 5 if </a:t>
             </a:r>
             <a:r>
               <a:rPr lang="en-US" sz="2000" b="1" dirty="0">
@@ -4424,10 +4486,18 @@
             <a:r>
               <a:rPr lang="en-US" sz="2000" b="1" dirty="0">
                 <a:solidFill>
+                  <a:srgbClr val="FF0000"/>
+                </a:solidFill>
+              </a:rPr>
+              <a:t>Solution:</a:t>
+            </a:r>
+            <a:r>
+              <a:rPr lang="en-US" sz="2000" b="1" dirty="0">
+                <a:solidFill>
                   <a:srgbClr val="4D5156"/>
                 </a:solidFill>
               </a:rPr>
-              <a:t>Solution: </a:t>
+              <a:t> </a:t>
             </a:r>
             <a:r>
               <a:rPr lang="en-US" sz="2000" dirty="0">
@@ -4451,7 +4521,23 @@
                   <a:srgbClr val="4D5156"/>
                 </a:solidFill>
               </a:rPr>
-              <a:t> and we know a dice contain 1 to 6 numbers, now if we remove the even number then remaining number will be 1, 3, 5. Now, to for getting 5 probability will be 1/3 =  0.33%.</a:t>
+              <a:t> and we know a dice contain 1 to 6 numbers, now if we remove the even number then the remaining number will be </a:t>
+            </a:r>
+            <a:r>
+              <a:rPr lang="en-US" sz="2000" b="1" dirty="0">
+                <a:solidFill>
+                  <a:srgbClr val="4D5156"/>
+                </a:solidFill>
+              </a:rPr>
+              <a:t>1, 3, 5</a:t>
+            </a:r>
+            <a:r>
+              <a:rPr lang="en-US" sz="2000" dirty="0">
+                <a:solidFill>
+                  <a:srgbClr val="4D5156"/>
+                </a:solidFill>
+              </a:rPr>
+              <a:t>. Now, for getting 5 probability will be 1/3 =  0.33%.</a:t>
             </a:r>
           </a:p>
           <a:p>
@@ -4529,8 +4615,8 @@
           </a:p>
         </p:txBody>
       </p:sp>
-      <mc:AlternateContent xmlns:mc="http://schemas.openxmlformats.org/markup-compatibility/2006" xmlns:a14="http://schemas.microsoft.com/office/drawing/2010/main">
-        <mc:Choice Requires="a14">
+      <mc:AlternateContent xmlns:mc="http://schemas.openxmlformats.org/markup-compatibility/2006">
+        <mc:Choice xmlns:a14="http://schemas.microsoft.com/office/drawing/2010/main" Requires="a14">
           <p:sp>
             <p:nvSpPr>
               <p:cNvPr id="6" name="Subtitle 2">
@@ -4547,8 +4633,8 @@
             </p:nvSpPr>
             <p:spPr>
               <a:xfrm>
-                <a:off x="407718" y="1769670"/>
-                <a:ext cx="11135098" cy="4607379"/>
+                <a:off x="407718" y="1769671"/>
+                <a:ext cx="11135098" cy="3925074"/>
               </a:xfrm>
               <a:prstGeom prst="rect">
                 <a:avLst/>
@@ -4731,43 +4817,7 @@
                     </a:solidFill>
                     <a:effectLst/>
                   </a:rPr>
-                  <a:t>In naïve bayes theorem provides a way of calculation posterior probability P(</a:t>
-                </a:r>
-                <a:r>
-                  <a:rPr lang="en-US" sz="2000" b="0" i="0" dirty="0" err="1">
-                    <a:solidFill>
-                      <a:srgbClr val="4D5156"/>
-                    </a:solidFill>
-                    <a:effectLst/>
-                  </a:rPr>
-                  <a:t>c|x</a:t>
-                </a:r>
-                <a:r>
-                  <a:rPr lang="en-US" sz="2000" b="0" i="0" dirty="0">
-                    <a:solidFill>
-                      <a:srgbClr val="4D5156"/>
-                    </a:solidFill>
-                    <a:effectLst/>
-                  </a:rPr>
-                  <a:t>) from P(c), P(x) and P(</a:t>
-                </a:r>
-                <a:r>
-                  <a:rPr lang="en-US" sz="2000" b="0" i="0" dirty="0" err="1">
-                    <a:solidFill>
-                      <a:srgbClr val="4D5156"/>
-                    </a:solidFill>
-                    <a:effectLst/>
-                  </a:rPr>
-                  <a:t>x|c</a:t>
-                </a:r>
-                <a:r>
-                  <a:rPr lang="en-US" sz="2000" b="0" i="0" dirty="0">
-                    <a:solidFill>
-                      <a:srgbClr val="4D5156"/>
-                    </a:solidFill>
-                    <a:effectLst/>
-                  </a:rPr>
-                  <a:t>). Look at the equation below:</a:t>
+                  <a:t>In Naïve Bayes theorem provides a way of calculating posterior probability P(c|x) from P(c), P(x) and P(x|c). Look at the equation below:</a:t>
                 </a:r>
                 <a:endParaRPr lang="en-US" sz="2600" b="1" i="0" dirty="0">
                   <a:solidFill>
@@ -4796,7 +4846,7 @@
                 <a14:m>
                   <m:oMath xmlns:m="http://schemas.openxmlformats.org/officeDocument/2006/math">
                     <m:r>
-                      <a:rPr lang="en-US" sz="2000" b="1" i="1" smtClean="0">
+                      <a:rPr lang="en-US" b="1" i="1" smtClean="0">
                         <a:solidFill>
                           <a:srgbClr val="4D5156"/>
                         </a:solidFill>
@@ -4808,7 +4858,7 @@
                     <m:d>
                       <m:dPr>
                         <m:ctrlPr>
-                          <a:rPr lang="en-US" sz="2000" b="1" i="1" smtClean="0">
+                          <a:rPr lang="en-US" b="1" i="1" smtClean="0">
                             <a:solidFill>
                               <a:srgbClr val="4D5156"/>
                             </a:solidFill>
@@ -4819,7 +4869,7 @@
                       </m:dPr>
                       <m:e>
                         <m:r>
-                          <a:rPr lang="en-US" sz="2000" b="1" i="1" smtClean="0">
+                          <a:rPr lang="en-US" b="1" i="1" smtClean="0">
                             <a:solidFill>
                               <a:srgbClr val="4D5156"/>
                             </a:solidFill>
@@ -4831,7 +4881,7 @@
                       </m:e>
                       <m:e>
                         <m:r>
-                          <a:rPr lang="en-US" sz="2000" b="1" i="1" smtClean="0">
+                          <a:rPr lang="en-US" b="1" i="1" smtClean="0">
                             <a:solidFill>
                               <a:srgbClr val="4D5156"/>
                             </a:solidFill>
@@ -4843,7 +4893,7 @@
                       </m:e>
                     </m:d>
                     <m:r>
-                      <a:rPr lang="en-US" sz="2000" b="1" i="1" smtClean="0">
+                      <a:rPr lang="en-US" b="1" i="1" smtClean="0">
                         <a:solidFill>
                           <a:srgbClr val="4D5156"/>
                         </a:solidFill>
@@ -4855,7 +4905,7 @@
                     <m:f>
                       <m:fPr>
                         <m:ctrlPr>
-                          <a:rPr lang="en-US" sz="2000" b="1" i="1" smtClean="0">
+                          <a:rPr lang="en-US" b="1" i="1" smtClean="0">
                             <a:solidFill>
                               <a:srgbClr val="4D5156"/>
                             </a:solidFill>
@@ -4866,7 +4916,7 @@
                       </m:fPr>
                       <m:num>
                         <m:r>
-                          <a:rPr lang="en-US" sz="2000" b="1" i="1" smtClean="0">
+                          <a:rPr lang="en-US" b="1" i="1" smtClean="0">
                             <a:solidFill>
                               <a:srgbClr val="4D5156"/>
                             </a:solidFill>
@@ -4876,7 +4926,7 @@
                           <m:t>𝑷</m:t>
                         </m:r>
                         <m:r>
-                          <a:rPr lang="en-US" sz="2000" b="1" i="1" smtClean="0">
+                          <a:rPr lang="en-US" b="1" i="1" smtClean="0">
                             <a:solidFill>
                               <a:srgbClr val="4D5156"/>
                             </a:solidFill>
@@ -4886,7 +4936,7 @@
                           <m:t>(</m:t>
                         </m:r>
                         <m:r>
-                          <a:rPr lang="en-US" sz="2000" b="1" i="1" smtClean="0">
+                          <a:rPr lang="en-US" b="1" i="1" smtClean="0">
                             <a:solidFill>
                               <a:srgbClr val="4D5156"/>
                             </a:solidFill>
@@ -4896,7 +4946,7 @@
                           <m:t>𝒙</m:t>
                         </m:r>
                         <m:r>
-                          <a:rPr lang="en-US" sz="2000" b="1" i="1" smtClean="0">
+                          <a:rPr lang="en-US" b="1" i="1" smtClean="0">
                             <a:solidFill>
                               <a:srgbClr val="4D5156"/>
                             </a:solidFill>
@@ -4906,7 +4956,7 @@
                           <m:t>|</m:t>
                         </m:r>
                         <m:r>
-                          <a:rPr lang="en-US" sz="2000" b="1" i="1" smtClean="0">
+                          <a:rPr lang="en-US" b="1" i="1" smtClean="0">
                             <a:solidFill>
                               <a:srgbClr val="4D5156"/>
                             </a:solidFill>
@@ -4916,7 +4966,7 @@
                           <m:t>𝒄</m:t>
                         </m:r>
                         <m:r>
-                          <a:rPr lang="en-US" sz="2000" b="1" i="1" smtClean="0">
+                          <a:rPr lang="en-US" b="1" i="1" smtClean="0">
                             <a:solidFill>
                               <a:srgbClr val="4D5156"/>
                             </a:solidFill>
@@ -4926,7 +4976,7 @@
                           <m:t>)×</m:t>
                         </m:r>
                         <m:r>
-                          <a:rPr lang="en-US" sz="2000" b="1" i="1" smtClean="0">
+                          <a:rPr lang="en-US" b="1" i="1" smtClean="0">
                             <a:solidFill>
                               <a:srgbClr val="4D5156"/>
                             </a:solidFill>
@@ -4937,7 +4987,7 @@
                           <m:t>𝑷</m:t>
                         </m:r>
                         <m:r>
-                          <a:rPr lang="en-US" sz="2000" b="1" i="1" smtClean="0">
+                          <a:rPr lang="en-US" b="1" i="1" smtClean="0">
                             <a:solidFill>
                               <a:srgbClr val="4D5156"/>
                             </a:solidFill>
@@ -4948,7 +4998,7 @@
                           <m:t>(</m:t>
                         </m:r>
                         <m:r>
-                          <a:rPr lang="en-US" sz="2000" b="1" i="1" smtClean="0">
+                          <a:rPr lang="en-US" b="1" i="1" smtClean="0">
                             <a:solidFill>
                               <a:srgbClr val="4D5156"/>
                             </a:solidFill>
@@ -4959,7 +5009,7 @@
                           <m:t>𝒄</m:t>
                         </m:r>
                         <m:r>
-                          <a:rPr lang="en-US" sz="2000" b="1" i="1" smtClean="0">
+                          <a:rPr lang="en-US" b="1" i="1" smtClean="0">
                             <a:solidFill>
                               <a:srgbClr val="4D5156"/>
                             </a:solidFill>
@@ -4972,7 +5022,7 @@
                       </m:num>
                       <m:den>
                         <m:r>
-                          <a:rPr lang="en-US" sz="2000" b="1" i="1" smtClean="0">
+                          <a:rPr lang="en-US" b="1" i="1" smtClean="0">
                             <a:solidFill>
                               <a:srgbClr val="4D5156"/>
                             </a:solidFill>
@@ -4982,7 +5032,7 @@
                           <m:t>𝑷</m:t>
                         </m:r>
                         <m:r>
-                          <a:rPr lang="en-US" sz="2000" b="1" i="1" smtClean="0">
+                          <a:rPr lang="en-US" b="1" i="1" smtClean="0">
                             <a:solidFill>
                               <a:srgbClr val="4D5156"/>
                             </a:solidFill>
@@ -4992,7 +5042,7 @@
                           <m:t>(</m:t>
                         </m:r>
                         <m:r>
-                          <a:rPr lang="en-US" sz="2000" b="1" i="1" smtClean="0">
+                          <a:rPr lang="en-US" b="1" i="1" smtClean="0">
                             <a:solidFill>
                               <a:srgbClr val="4D5156"/>
                             </a:solidFill>
@@ -5002,7 +5052,7 @@
                           <m:t>𝒙</m:t>
                         </m:r>
                         <m:r>
-                          <a:rPr lang="en-US" sz="2000" b="1" i="1" smtClean="0">
+                          <a:rPr lang="en-US" b="1" i="1" smtClean="0">
                             <a:solidFill>
                               <a:srgbClr val="4D5156"/>
                             </a:solidFill>
@@ -5045,25 +5095,7 @@
                     </a:solidFill>
                     <a:effectLst/>
                   </a:rPr>
-                  <a:t>P(</a:t>
-                </a:r>
-                <a:r>
-                  <a:rPr lang="en-US" sz="1800" b="0" i="0" dirty="0" err="1">
-                    <a:solidFill>
-                      <a:srgbClr val="4D5156"/>
-                    </a:solidFill>
-                    <a:effectLst/>
-                  </a:rPr>
-                  <a:t>c|x</a:t>
-                </a:r>
-                <a:r>
-                  <a:rPr lang="en-US" sz="1800" b="0" i="0" dirty="0">
-                    <a:solidFill>
-                      <a:srgbClr val="4D5156"/>
-                    </a:solidFill>
-                    <a:effectLst/>
-                  </a:rPr>
-                  <a:t>) is the posterior probability of class(c, target) given predictor(x, attributes).</a:t>
+                  <a:t>P(c|x) is the posterior probability of class(c, target) given predictor(x, attributes).</a:t>
                 </a:r>
               </a:p>
               <a:p>
@@ -5092,23 +5124,7 @@
                       <a:srgbClr val="4D5156"/>
                     </a:solidFill>
                   </a:rPr>
-                  <a:t>P(</a:t>
-                </a:r>
-                <a:r>
-                  <a:rPr lang="en-US" sz="1800" dirty="0" err="1">
-                    <a:solidFill>
-                      <a:srgbClr val="4D5156"/>
-                    </a:solidFill>
-                  </a:rPr>
-                  <a:t>x|c</a:t>
-                </a:r>
-                <a:r>
-                  <a:rPr lang="en-US" sz="1800" dirty="0">
-                    <a:solidFill>
-                      <a:srgbClr val="4D5156"/>
-                    </a:solidFill>
-                  </a:rPr>
-                  <a:t>) is the likelihood which is the probability of predictor given class.</a:t>
+                  <a:t>P(x|c) is the likelihood which is the probability of predictor given class.</a:t>
                 </a:r>
               </a:p>
               <a:p>
@@ -5129,7 +5145,7 @@
             </p:txBody>
           </p:sp>
         </mc:Choice>
-        <mc:Fallback xmlns="">
+        <mc:Fallback>
           <p:sp>
             <p:nvSpPr>
               <p:cNvPr id="6" name="Subtitle 2">
@@ -5146,8 +5162,8 @@
             </p:nvSpPr>
             <p:spPr>
               <a:xfrm>
-                <a:off x="407718" y="1769670"/>
-                <a:ext cx="11135098" cy="4607379"/>
+                <a:off x="407718" y="1769671"/>
+                <a:ext cx="11135098" cy="3925074"/>
               </a:xfrm>
               <a:prstGeom prst="rect">
                 <a:avLst/>
@@ -5155,7 +5171,7 @@
               <a:blipFill>
                 <a:blip r:embed="rId2"/>
                 <a:stretch>
-                  <a:fillRect l="-602" t="-1323" r="-547"/>
+                  <a:fillRect l="-602" t="-1553" r="-547"/>
                 </a:stretch>
               </a:blipFill>
             </p:spPr>
@@ -5533,7 +5549,7 @@
                   <a:srgbClr val="111111"/>
                 </a:solidFill>
               </a:rPr>
-              <a:t>What is likelihood?</a:t>
+              <a:t>What is the likelihood?</a:t>
             </a:r>
           </a:p>
           <a:p>
@@ -5545,7 +5561,7 @@
                 </a:solidFill>
                 <a:effectLst/>
               </a:rPr>
-              <a:t>Likelihood function is a fundamental concept in statistical inference. It </a:t>
+              <a:t>The likelihood function is a fundamental concept in statistical inference. It </a:t>
             </a:r>
             <a:r>
               <a:rPr lang="en-US" sz="2000" b="1" i="0" dirty="0">

</xml_diff>